<commit_message>
second to last update
</commit_message>
<xml_diff>
--- a/Predictive Analytics.pptx
+++ b/Predictive Analytics.pptx
@@ -7,8 +7,10 @@
   <p:sldIdLst>
     <p:sldId id="256" r:id="rId2"/>
     <p:sldId id="257" r:id="rId3"/>
-    <p:sldId id="258" r:id="rId4"/>
-    <p:sldId id="260" r:id="rId5"/>
+    <p:sldId id="263" r:id="rId4"/>
+    <p:sldId id="258" r:id="rId5"/>
+    <p:sldId id="262" r:id="rId6"/>
+    <p:sldId id="260" r:id="rId7"/>
   </p:sldIdLst>
   <p:sldSz cx="12192000" cy="6858000"/>
   <p:notesSz cx="6858000" cy="9144000"/>
@@ -107,11 +109,16 @@
       </a:defRPr>
     </a:lvl9pPr>
   </p:defaultTextStyle>
+  <p:extLst>
+    <p:ext uri="{EFAFB233-063F-42B5-8137-9DF3F51BA10A}">
+      <p15:sldGuideLst xmlns:p15="http://schemas.microsoft.com/office/powerpoint/2012/main"/>
+    </p:ext>
+  </p:extLst>
 </p:presentation>
 </file>
 
 <file path=ppt/slideLayouts/slideLayout1.xml><?xml version="1.0" encoding="utf-8"?>
-<p:sldLayout xmlns:a="http://schemas.openxmlformats.org/drawingml/2006/main" xmlns:r="http://schemas.openxmlformats.org/officeDocument/2006/relationships" xmlns:p="http://schemas.openxmlformats.org/presentationml/2006/main" type="title" preserve="1">
+<p:sldLayout xmlns:a="http://schemas.openxmlformats.org/drawingml/2006/main" xmlns:r="http://schemas.openxmlformats.org/officeDocument/2006/relationships" xmlns:p="http://schemas.openxmlformats.org/presentationml/2006/main" showMasterSp="0" type="title" preserve="1">
   <p:cSld name="Title Slide">
     <p:spTree>
       <p:nvGrpSpPr>
@@ -296,7 +303,7 @@
           <a:p>
             <a:fld id="{4965C16A-AC18-4475-A509-82CD360B3E74}" type="datetimeFigureOut">
               <a:rPr lang="en-US" smtClean="0"/>
-              <a:t>11/6/2022</a:t>
+              <a:t>11/8/2022</a:t>
             </a:fld>
             <a:endParaRPr lang="en-US"/>
           </a:p>
@@ -358,7 +365,7 @@
 </file>
 
 <file path=ppt/slideLayouts/slideLayout10.xml><?xml version="1.0" encoding="utf-8"?>
-<p:sldLayout xmlns:a="http://schemas.openxmlformats.org/drawingml/2006/main" xmlns:r="http://schemas.openxmlformats.org/officeDocument/2006/relationships" xmlns:p="http://schemas.openxmlformats.org/presentationml/2006/main" preserve="1">
+<p:sldLayout xmlns:a="http://schemas.openxmlformats.org/drawingml/2006/main" xmlns:r="http://schemas.openxmlformats.org/officeDocument/2006/relationships" xmlns:p="http://schemas.openxmlformats.org/presentationml/2006/main" showMasterSp="0" preserve="1">
   <p:cSld name="Panoramic Picture with Caption">
     <p:spTree>
       <p:nvGrpSpPr>
@@ -571,7 +578,7 @@
           <a:p>
             <a:fld id="{4965C16A-AC18-4475-A509-82CD360B3E74}" type="datetimeFigureOut">
               <a:rPr lang="en-US" smtClean="0"/>
-              <a:t>11/6/2022</a:t>
+              <a:t>11/8/2022</a:t>
             </a:fld>
             <a:endParaRPr lang="en-US"/>
           </a:p>
@@ -633,7 +640,7 @@
 </file>
 
 <file path=ppt/slideLayouts/slideLayout11.xml><?xml version="1.0" encoding="utf-8"?>
-<p:sldLayout xmlns:a="http://schemas.openxmlformats.org/drawingml/2006/main" xmlns:r="http://schemas.openxmlformats.org/officeDocument/2006/relationships" xmlns:p="http://schemas.openxmlformats.org/presentationml/2006/main" preserve="1">
+<p:sldLayout xmlns:a="http://schemas.openxmlformats.org/drawingml/2006/main" xmlns:r="http://schemas.openxmlformats.org/officeDocument/2006/relationships" xmlns:p="http://schemas.openxmlformats.org/presentationml/2006/main" showMasterSp="0" preserve="1">
   <p:cSld name="Title and Caption">
     <p:spTree>
       <p:nvGrpSpPr>
@@ -765,7 +772,7 @@
           <a:p>
             <a:fld id="{4965C16A-AC18-4475-A509-82CD360B3E74}" type="datetimeFigureOut">
               <a:rPr lang="en-US" smtClean="0"/>
-              <a:t>11/6/2022</a:t>
+              <a:t>11/8/2022</a:t>
             </a:fld>
             <a:endParaRPr lang="en-US"/>
           </a:p>
@@ -827,7 +834,7 @@
 </file>
 
 <file path=ppt/slideLayouts/slideLayout12.xml><?xml version="1.0" encoding="utf-8"?>
-<p:sldLayout xmlns:a="http://schemas.openxmlformats.org/drawingml/2006/main" xmlns:r="http://schemas.openxmlformats.org/officeDocument/2006/relationships" xmlns:p="http://schemas.openxmlformats.org/presentationml/2006/main" preserve="1">
+<p:sldLayout xmlns:a="http://schemas.openxmlformats.org/drawingml/2006/main" xmlns:r="http://schemas.openxmlformats.org/officeDocument/2006/relationships" xmlns:p="http://schemas.openxmlformats.org/presentationml/2006/main" showMasterSp="0" preserve="1">
   <p:cSld name="Quote with Caption">
     <p:spTree>
       <p:nvGrpSpPr>
@@ -1038,7 +1045,7 @@
           <a:p>
             <a:fld id="{4965C16A-AC18-4475-A509-82CD360B3E74}" type="datetimeFigureOut">
               <a:rPr lang="en-US" smtClean="0"/>
-              <a:t>11/6/2022</a:t>
+              <a:t>11/8/2022</a:t>
             </a:fld>
             <a:endParaRPr lang="en-US"/>
           </a:p>
@@ -1194,7 +1201,7 @@
 </file>
 
 <file path=ppt/slideLayouts/slideLayout13.xml><?xml version="1.0" encoding="utf-8"?>
-<p:sldLayout xmlns:a="http://schemas.openxmlformats.org/drawingml/2006/main" xmlns:r="http://schemas.openxmlformats.org/officeDocument/2006/relationships" xmlns:p="http://schemas.openxmlformats.org/presentationml/2006/main" preserve="1">
+<p:sldLayout xmlns:a="http://schemas.openxmlformats.org/drawingml/2006/main" xmlns:r="http://schemas.openxmlformats.org/officeDocument/2006/relationships" xmlns:p="http://schemas.openxmlformats.org/presentationml/2006/main" showMasterSp="0" preserve="1">
   <p:cSld name="Name Card">
     <p:spTree>
       <p:nvGrpSpPr>
@@ -1379,7 +1386,7 @@
           <a:p>
             <a:fld id="{4965C16A-AC18-4475-A509-82CD360B3E74}" type="datetimeFigureOut">
               <a:rPr lang="en-US" smtClean="0"/>
-              <a:t>11/6/2022</a:t>
+              <a:t>11/8/2022</a:t>
             </a:fld>
             <a:endParaRPr lang="en-US"/>
           </a:p>
@@ -1441,7 +1448,7 @@
 </file>
 
 <file path=ppt/slideLayouts/slideLayout14.xml><?xml version="1.0" encoding="utf-8"?>
-<p:sldLayout xmlns:a="http://schemas.openxmlformats.org/drawingml/2006/main" xmlns:r="http://schemas.openxmlformats.org/officeDocument/2006/relationships" xmlns:p="http://schemas.openxmlformats.org/presentationml/2006/main" preserve="1">
+<p:sldLayout xmlns:a="http://schemas.openxmlformats.org/drawingml/2006/main" xmlns:r="http://schemas.openxmlformats.org/officeDocument/2006/relationships" xmlns:p="http://schemas.openxmlformats.org/presentationml/2006/main" showMasterSp="0" preserve="1">
   <p:cSld name="3 Column">
     <p:spTree>
       <p:nvGrpSpPr>
@@ -2002,7 +2009,7 @@
           <a:p>
             <a:fld id="{4965C16A-AC18-4475-A509-82CD360B3E74}" type="datetimeFigureOut">
               <a:rPr lang="en-US" smtClean="0"/>
-              <a:t>11/6/2022</a:t>
+              <a:t>11/8/2022</a:t>
             </a:fld>
             <a:endParaRPr lang="en-US"/>
           </a:p>
@@ -2064,7 +2071,7 @@
 </file>
 
 <file path=ppt/slideLayouts/slideLayout15.xml><?xml version="1.0" encoding="utf-8"?>
-<p:sldLayout xmlns:a="http://schemas.openxmlformats.org/drawingml/2006/main" xmlns:r="http://schemas.openxmlformats.org/officeDocument/2006/relationships" xmlns:p="http://schemas.openxmlformats.org/presentationml/2006/main" preserve="1">
+<p:sldLayout xmlns:a="http://schemas.openxmlformats.org/drawingml/2006/main" xmlns:r="http://schemas.openxmlformats.org/officeDocument/2006/relationships" xmlns:p="http://schemas.openxmlformats.org/presentationml/2006/main" showMasterSp="0" preserve="1">
   <p:cSld name="3 Picture Column">
     <p:spTree>
       <p:nvGrpSpPr>
@@ -2862,7 +2869,7 @@
           <a:p>
             <a:fld id="{4965C16A-AC18-4475-A509-82CD360B3E74}" type="datetimeFigureOut">
               <a:rPr lang="en-US" smtClean="0"/>
-              <a:t>11/6/2022</a:t>
+              <a:t>11/8/2022</a:t>
             </a:fld>
             <a:endParaRPr lang="en-US"/>
           </a:p>
@@ -2924,7 +2931,7 @@
 </file>
 
 <file path=ppt/slideLayouts/slideLayout16.xml><?xml version="1.0" encoding="utf-8"?>
-<p:sldLayout xmlns:a="http://schemas.openxmlformats.org/drawingml/2006/main" xmlns:r="http://schemas.openxmlformats.org/officeDocument/2006/relationships" xmlns:p="http://schemas.openxmlformats.org/presentationml/2006/main" type="vertTx" preserve="1">
+<p:sldLayout xmlns:a="http://schemas.openxmlformats.org/drawingml/2006/main" xmlns:r="http://schemas.openxmlformats.org/officeDocument/2006/relationships" xmlns:p="http://schemas.openxmlformats.org/presentationml/2006/main" showMasterSp="0" type="vertTx" preserve="1">
   <p:cSld name="Title and Vertical Text">
     <p:spTree>
       <p:nvGrpSpPr>
@@ -3032,7 +3039,7 @@
           <a:p>
             <a:fld id="{4965C16A-AC18-4475-A509-82CD360B3E74}" type="datetimeFigureOut">
               <a:rPr lang="en-US" smtClean="0"/>
-              <a:t>11/6/2022</a:t>
+              <a:t>11/8/2022</a:t>
             </a:fld>
             <a:endParaRPr lang="en-US"/>
           </a:p>
@@ -3094,7 +3101,7 @@
 </file>
 
 <file path=ppt/slideLayouts/slideLayout17.xml><?xml version="1.0" encoding="utf-8"?>
-<p:sldLayout xmlns:a="http://schemas.openxmlformats.org/drawingml/2006/main" xmlns:r="http://schemas.openxmlformats.org/officeDocument/2006/relationships" xmlns:p="http://schemas.openxmlformats.org/presentationml/2006/main" type="vertTitleAndTx" preserve="1">
+<p:sldLayout xmlns:a="http://schemas.openxmlformats.org/drawingml/2006/main" xmlns:r="http://schemas.openxmlformats.org/officeDocument/2006/relationships" xmlns:p="http://schemas.openxmlformats.org/presentationml/2006/main" showMasterSp="0" type="vertTitleAndTx" preserve="1">
   <p:cSld name="Vertical Title and Text">
     <p:spTree>
       <p:nvGrpSpPr>
@@ -3212,7 +3219,7 @@
           <a:p>
             <a:fld id="{4965C16A-AC18-4475-A509-82CD360B3E74}" type="datetimeFigureOut">
               <a:rPr lang="en-US" smtClean="0"/>
-              <a:t>11/6/2022</a:t>
+              <a:t>11/8/2022</a:t>
             </a:fld>
             <a:endParaRPr lang="en-US"/>
           </a:p>
@@ -3274,7 +3281,7 @@
 </file>
 
 <file path=ppt/slideLayouts/slideLayout2.xml><?xml version="1.0" encoding="utf-8"?>
-<p:sldLayout xmlns:a="http://schemas.openxmlformats.org/drawingml/2006/main" xmlns:r="http://schemas.openxmlformats.org/officeDocument/2006/relationships" xmlns:p="http://schemas.openxmlformats.org/presentationml/2006/main" type="obj" preserve="1">
+<p:sldLayout xmlns:a="http://schemas.openxmlformats.org/drawingml/2006/main" xmlns:r="http://schemas.openxmlformats.org/officeDocument/2006/relationships" xmlns:p="http://schemas.openxmlformats.org/presentationml/2006/main" showMasterSp="0" type="obj" preserve="1">
   <p:cSld name="Title and Content">
     <p:spTree>
       <p:nvGrpSpPr>
@@ -3382,7 +3389,7 @@
           <a:p>
             <a:fld id="{4965C16A-AC18-4475-A509-82CD360B3E74}" type="datetimeFigureOut">
               <a:rPr lang="en-US" smtClean="0"/>
-              <a:t>11/6/2022</a:t>
+              <a:t>11/8/2022</a:t>
             </a:fld>
             <a:endParaRPr lang="en-US"/>
           </a:p>
@@ -3444,7 +3451,7 @@
 </file>
 
 <file path=ppt/slideLayouts/slideLayout3.xml><?xml version="1.0" encoding="utf-8"?>
-<p:sldLayout xmlns:a="http://schemas.openxmlformats.org/drawingml/2006/main" xmlns:r="http://schemas.openxmlformats.org/officeDocument/2006/relationships" xmlns:p="http://schemas.openxmlformats.org/presentationml/2006/main" type="secHead" preserve="1">
+<p:sldLayout xmlns:a="http://schemas.openxmlformats.org/drawingml/2006/main" xmlns:r="http://schemas.openxmlformats.org/officeDocument/2006/relationships" xmlns:p="http://schemas.openxmlformats.org/presentationml/2006/main" showMasterSp="0" type="secHead" preserve="1">
   <p:cSld name="Section Header">
     <p:spTree>
       <p:nvGrpSpPr>
@@ -3629,7 +3636,7 @@
           <a:p>
             <a:fld id="{4965C16A-AC18-4475-A509-82CD360B3E74}" type="datetimeFigureOut">
               <a:rPr lang="en-US" smtClean="0"/>
-              <a:t>11/6/2022</a:t>
+              <a:t>11/8/2022</a:t>
             </a:fld>
             <a:endParaRPr lang="en-US"/>
           </a:p>
@@ -3691,7 +3698,7 @@
 </file>
 
 <file path=ppt/slideLayouts/slideLayout4.xml><?xml version="1.0" encoding="utf-8"?>
-<p:sldLayout xmlns:a="http://schemas.openxmlformats.org/drawingml/2006/main" xmlns:r="http://schemas.openxmlformats.org/officeDocument/2006/relationships" xmlns:p="http://schemas.openxmlformats.org/presentationml/2006/main" type="twoObj" preserve="1">
+<p:sldLayout xmlns:a="http://schemas.openxmlformats.org/drawingml/2006/main" xmlns:r="http://schemas.openxmlformats.org/officeDocument/2006/relationships" xmlns:p="http://schemas.openxmlformats.org/presentationml/2006/main" showMasterSp="0" type="twoObj" preserve="1">
   <p:cSld name="Two Content">
     <p:spTree>
       <p:nvGrpSpPr>
@@ -3921,7 +3928,7 @@
           <a:p>
             <a:fld id="{4965C16A-AC18-4475-A509-82CD360B3E74}" type="datetimeFigureOut">
               <a:rPr lang="en-US" smtClean="0"/>
-              <a:t>11/6/2022</a:t>
+              <a:t>11/8/2022</a:t>
             </a:fld>
             <a:endParaRPr lang="en-US"/>
           </a:p>
@@ -3983,7 +3990,7 @@
 </file>
 
 <file path=ppt/slideLayouts/slideLayout5.xml><?xml version="1.0" encoding="utf-8"?>
-<p:sldLayout xmlns:a="http://schemas.openxmlformats.org/drawingml/2006/main" xmlns:r="http://schemas.openxmlformats.org/officeDocument/2006/relationships" xmlns:p="http://schemas.openxmlformats.org/presentationml/2006/main" type="twoTxTwoObj" preserve="1">
+<p:sldLayout xmlns:a="http://schemas.openxmlformats.org/drawingml/2006/main" xmlns:r="http://schemas.openxmlformats.org/officeDocument/2006/relationships" xmlns:p="http://schemas.openxmlformats.org/presentationml/2006/main" showMasterSp="0" type="twoTxTwoObj" preserve="1">
   <p:cSld name="Comparison">
     <p:spTree>
       <p:nvGrpSpPr>
@@ -4365,7 +4372,7 @@
           <a:p>
             <a:fld id="{4965C16A-AC18-4475-A509-82CD360B3E74}" type="datetimeFigureOut">
               <a:rPr lang="en-US" smtClean="0"/>
-              <a:t>11/6/2022</a:t>
+              <a:t>11/8/2022</a:t>
             </a:fld>
             <a:endParaRPr lang="en-US"/>
           </a:p>
@@ -4427,7 +4434,7 @@
 </file>
 
 <file path=ppt/slideLayouts/slideLayout6.xml><?xml version="1.0" encoding="utf-8"?>
-<p:sldLayout xmlns:a="http://schemas.openxmlformats.org/drawingml/2006/main" xmlns:r="http://schemas.openxmlformats.org/officeDocument/2006/relationships" xmlns:p="http://schemas.openxmlformats.org/presentationml/2006/main" type="titleOnly" preserve="1">
+<p:sldLayout xmlns:a="http://schemas.openxmlformats.org/drawingml/2006/main" xmlns:r="http://schemas.openxmlformats.org/officeDocument/2006/relationships" xmlns:p="http://schemas.openxmlformats.org/presentationml/2006/main" showMasterSp="0" type="titleOnly" preserve="1">
   <p:cSld name="Title Only">
     <p:spTree>
       <p:nvGrpSpPr>
@@ -4483,7 +4490,7 @@
           <a:p>
             <a:fld id="{4965C16A-AC18-4475-A509-82CD360B3E74}" type="datetimeFigureOut">
               <a:rPr lang="en-US" smtClean="0"/>
-              <a:t>11/6/2022</a:t>
+              <a:t>11/8/2022</a:t>
             </a:fld>
             <a:endParaRPr lang="en-US"/>
           </a:p>
@@ -4545,7 +4552,7 @@
 </file>
 
 <file path=ppt/slideLayouts/slideLayout7.xml><?xml version="1.0" encoding="utf-8"?>
-<p:sldLayout xmlns:a="http://schemas.openxmlformats.org/drawingml/2006/main" xmlns:r="http://schemas.openxmlformats.org/officeDocument/2006/relationships" xmlns:p="http://schemas.openxmlformats.org/presentationml/2006/main" type="blank" preserve="1">
+<p:sldLayout xmlns:a="http://schemas.openxmlformats.org/drawingml/2006/main" xmlns:r="http://schemas.openxmlformats.org/officeDocument/2006/relationships" xmlns:p="http://schemas.openxmlformats.org/presentationml/2006/main" showMasterSp="0" type="blank" preserve="1">
   <p:cSld name="Blank">
     <p:spTree>
       <p:nvGrpSpPr>
@@ -4578,7 +4585,7 @@
           <a:p>
             <a:fld id="{4965C16A-AC18-4475-A509-82CD360B3E74}" type="datetimeFigureOut">
               <a:rPr lang="en-US" smtClean="0"/>
-              <a:t>11/6/2022</a:t>
+              <a:t>11/8/2022</a:t>
             </a:fld>
             <a:endParaRPr lang="en-US"/>
           </a:p>
@@ -4640,7 +4647,7 @@
 </file>
 
 <file path=ppt/slideLayouts/slideLayout8.xml><?xml version="1.0" encoding="utf-8"?>
-<p:sldLayout xmlns:a="http://schemas.openxmlformats.org/drawingml/2006/main" xmlns:r="http://schemas.openxmlformats.org/officeDocument/2006/relationships" xmlns:p="http://schemas.openxmlformats.org/presentationml/2006/main" type="objTx" preserve="1">
+<p:sldLayout xmlns:a="http://schemas.openxmlformats.org/drawingml/2006/main" xmlns:r="http://schemas.openxmlformats.org/officeDocument/2006/relationships" xmlns:p="http://schemas.openxmlformats.org/presentationml/2006/main" showMasterSp="0" type="objTx" preserve="1">
   <p:cSld name="Content with Caption">
     <p:spTree>
       <p:nvGrpSpPr>
@@ -4857,7 +4864,7 @@
           <a:p>
             <a:fld id="{4965C16A-AC18-4475-A509-82CD360B3E74}" type="datetimeFigureOut">
               <a:rPr lang="en-US" smtClean="0"/>
-              <a:t>11/6/2022</a:t>
+              <a:t>11/8/2022</a:t>
             </a:fld>
             <a:endParaRPr lang="en-US"/>
           </a:p>
@@ -4919,7 +4926,7 @@
 </file>
 
 <file path=ppt/slideLayouts/slideLayout9.xml><?xml version="1.0" encoding="utf-8"?>
-<p:sldLayout xmlns:a="http://schemas.openxmlformats.org/drawingml/2006/main" xmlns:r="http://schemas.openxmlformats.org/officeDocument/2006/relationships" xmlns:p="http://schemas.openxmlformats.org/presentationml/2006/main" type="picTx" preserve="1">
+<p:sldLayout xmlns:a="http://schemas.openxmlformats.org/drawingml/2006/main" xmlns:r="http://schemas.openxmlformats.org/officeDocument/2006/relationships" xmlns:p="http://schemas.openxmlformats.org/presentationml/2006/main" showMasterSp="0" type="picTx" preserve="1">
   <p:cSld name="Picture with Caption">
     <p:spTree>
       <p:nvGrpSpPr>
@@ -5132,7 +5139,7 @@
           <a:p>
             <a:fld id="{4965C16A-AC18-4475-A509-82CD360B3E74}" type="datetimeFigureOut">
               <a:rPr lang="en-US" smtClean="0"/>
-              <a:t>11/6/2022</a:t>
+              <a:t>11/8/2022</a:t>
             </a:fld>
             <a:endParaRPr lang="en-US"/>
           </a:p>
@@ -5197,9 +5204,12 @@
 <p:sldMaster xmlns:a="http://schemas.openxmlformats.org/drawingml/2006/main" xmlns:r="http://schemas.openxmlformats.org/officeDocument/2006/relationships" xmlns:p="http://schemas.openxmlformats.org/presentationml/2006/main">
   <p:cSld>
     <p:bg>
-      <p:bgRef idx="1003">
-        <a:schemeClr val="bg2"/>
-      </p:bgRef>
+      <p:bgPr>
+        <a:solidFill>
+          <a:schemeClr val="bg2"/>
+        </a:solidFill>
+        <a:effectLst/>
+      </p:bgPr>
     </p:bg>
     <p:spTree>
       <p:nvGrpSpPr>
@@ -5561,7 +5571,7 @@
           <a:p>
             <a:fld id="{4965C16A-AC18-4475-A509-82CD360B3E74}" type="datetimeFigureOut">
               <a:rPr lang="en-US" smtClean="0"/>
-              <a:t>11/6/2022</a:t>
+              <a:t>11/8/2022</a:t>
             </a:fld>
             <a:endParaRPr lang="en-US"/>
           </a:p>
@@ -6075,14 +6085,6 @@
 <file path=ppt/slides/slide1.xml><?xml version="1.0" encoding="utf-8"?>
 <p:sld xmlns:a="http://schemas.openxmlformats.org/drawingml/2006/main" xmlns:r="http://schemas.openxmlformats.org/officeDocument/2006/relationships" xmlns:p="http://schemas.openxmlformats.org/presentationml/2006/main" showMasterSp="0">
   <p:cSld>
-    <p:bg>
-      <p:bgPr>
-        <a:solidFill>
-          <a:srgbClr val="1E5155"/>
-        </a:solidFill>
-        <a:effectLst/>
-      </p:bgPr>
-    </p:bg>
     <p:spTree>
       <p:nvGrpSpPr>
         <p:cNvPr id="1" name=""/>
@@ -6188,14 +6190,6 @@
 <file path=ppt/slides/slide2.xml><?xml version="1.0" encoding="utf-8"?>
 <p:sld xmlns:a="http://schemas.openxmlformats.org/drawingml/2006/main" xmlns:r="http://schemas.openxmlformats.org/officeDocument/2006/relationships" xmlns:p="http://schemas.openxmlformats.org/presentationml/2006/main" showMasterSp="0">
   <p:cSld>
-    <p:bg>
-      <p:bgPr>
-        <a:solidFill>
-          <a:schemeClr val="bg2"/>
-        </a:solidFill>
-        <a:effectLst/>
-      </p:bgPr>
-    </p:bg>
     <p:spTree>
       <p:nvGrpSpPr>
         <p:cNvPr id="1" name=""/>
@@ -6266,39 +6260,101 @@
           </a:xfrm>
         </p:spPr>
         <p:txBody>
-          <a:bodyPr/>
+          <a:bodyPr>
+            <a:normAutofit/>
+          </a:bodyPr>
           <a:lstStyle/>
           <a:p>
             <a:r>
-              <a:rPr lang="en-US" b="1" dirty="0"/>
+              <a:rPr lang="en-US" sz="2400" b="1" dirty="0"/>
               <a:t>ML Marathon Dataset by Azure Developer Community</a:t>
             </a:r>
           </a:p>
           <a:p>
             <a:pPr lvl="1"/>
             <a:r>
-              <a:rPr lang="en-US" dirty="0"/>
+              <a:rPr lang="en-US" dirty="0">
+                <a:effectLst/>
+              </a:rPr>
+              <a:t>Parihar, D. (2022, October 13). </a:t>
+            </a:r>
+            <a:r>
+              <a:rPr lang="en-US" i="1" dirty="0">
+                <a:effectLst/>
+              </a:rPr>
+              <a:t>ML Marathon dataset by Azure Developer Community</a:t>
+            </a:r>
+            <a:r>
+              <a:rPr lang="en-US" dirty="0">
+                <a:effectLst/>
+              </a:rPr>
+              <a:t>. Kaggle. Retrieved November 8, 2022, from </a:t>
+            </a:r>
+            <a:r>
+              <a:rPr lang="en-US" dirty="0">
+                <a:effectLst/>
+                <a:hlinkClick r:id="rId2"/>
+              </a:rPr>
+              <a:t>https://www.kaggle.com/datasets/dev523/ml-marathon-dataset-by-azure-developer-community?select=data.csv </a:t>
+            </a:r>
+            <a:endParaRPr lang="en-US" sz="2400" b="1" dirty="0"/>
+          </a:p>
+          <a:p>
+            <a:pPr lvl="1"/>
+            <a:r>
+              <a:rPr lang="en-US" sz="2000" dirty="0"/>
               <a:t>16 predictor variables</a:t>
             </a:r>
           </a:p>
           <a:p>
             <a:pPr lvl="2"/>
             <a:r>
-              <a:rPr lang="en-US" dirty="0"/>
-              <a:t>10 categorical</a:t>
-            </a:r>
+              <a:rPr lang="en-US" sz="1800" dirty="0"/>
+              <a:t>9 categorical</a:t>
+            </a:r>
+          </a:p>
+          <a:p>
+            <a:pPr lvl="3"/>
+            <a:r>
+              <a:rPr lang="en-US" sz="1600" dirty="0"/>
+              <a:t>job, marital, education, default, housing, loan, contact, month, </a:t>
+            </a:r>
+            <a:r>
+              <a:rPr lang="en-US" sz="1600" dirty="0" err="1"/>
+              <a:t>poutcome</a:t>
+            </a:r>
+            <a:endParaRPr lang="en-US" sz="1600" dirty="0"/>
           </a:p>
           <a:p>
             <a:pPr lvl="2"/>
             <a:r>
-              <a:rPr lang="en-US" dirty="0"/>
-              <a:t>6 numeric</a:t>
-            </a:r>
+              <a:rPr lang="en-US" sz="1800" dirty="0"/>
+              <a:t>7 numeric</a:t>
+            </a:r>
+          </a:p>
+          <a:p>
+            <a:pPr lvl="3"/>
+            <a:r>
+              <a:rPr lang="en-US" sz="1600" dirty="0"/>
+              <a:t>age, balance, duration, campaign, day, </a:t>
+            </a:r>
+            <a:r>
+              <a:rPr lang="en-US" sz="1600" dirty="0" err="1"/>
+              <a:t>pdays</a:t>
+            </a:r>
+            <a:r>
+              <a:rPr lang="en-US" sz="1600" dirty="0"/>
+              <a:t>, previous</a:t>
+            </a:r>
+          </a:p>
+          <a:p>
+            <a:pPr lvl="3"/>
+            <a:endParaRPr lang="en-US" sz="1600" dirty="0"/>
           </a:p>
           <a:p>
             <a:pPr lvl="1"/>
             <a:r>
-              <a:rPr lang="en-US" dirty="0"/>
+              <a:rPr lang="en-US" sz="2000" dirty="0"/>
               <a:t>1 outcome variable (categorical) - deposit</a:t>
             </a:r>
           </a:p>
@@ -6320,14 +6376,6 @@
 <file path=ppt/slides/slide3.xml><?xml version="1.0" encoding="utf-8"?>
 <p:sld xmlns:a="http://schemas.openxmlformats.org/drawingml/2006/main" xmlns:r="http://schemas.openxmlformats.org/officeDocument/2006/relationships" xmlns:p="http://schemas.openxmlformats.org/presentationml/2006/main" showMasterSp="0">
   <p:cSld>
-    <p:bg>
-      <p:bgPr>
-        <a:solidFill>
-          <a:schemeClr val="bg2"/>
-        </a:solidFill>
-        <a:effectLst/>
-      </p:bgPr>
-    </p:bg>
     <p:spTree>
       <p:nvGrpSpPr>
         <p:cNvPr id="1" name=""/>
@@ -6344,71 +6392,275 @@
       </p:grpSpPr>
       <p:sp>
         <p:nvSpPr>
-          <p:cNvPr id="2" name="Title 1">
+          <p:cNvPr id="6" name="Title 1">
             <a:extLst>
               <a:ext uri="{FF2B5EF4-FFF2-40B4-BE49-F238E27FC236}">
-                <a16:creationId xmlns:a16="http://schemas.microsoft.com/office/drawing/2014/main" id="{0C971921-7283-188C-DD57-582B84E62961}"/>
+                <a16:creationId xmlns:a16="http://schemas.microsoft.com/office/drawing/2014/main" id="{29A764FB-E515-C33A-0665-686A23D92766}"/>
               </a:ext>
             </a:extLst>
           </p:cNvPr>
-          <p:cNvSpPr>
-            <a:spLocks noGrp="1"/>
-          </p:cNvSpPr>
-          <p:nvPr>
-            <p:ph type="title"/>
-          </p:nvPr>
-        </p:nvSpPr>
-        <p:spPr>
-          <a:xfrm>
-            <a:off x="646111" y="452718"/>
-            <a:ext cx="9404723" cy="794191"/>
-          </a:xfrm>
-        </p:spPr>
-        <p:txBody>
-          <a:bodyPr/>
-          <a:lstStyle/>
+          <p:cNvSpPr txBox="1">
+            <a:spLocks/>
+          </p:cNvSpPr>
+          <p:nvPr/>
+        </p:nvSpPr>
+        <p:spPr>
+          <a:xfrm>
+            <a:off x="812801" y="452718"/>
+            <a:ext cx="9071344" cy="748009"/>
+          </a:xfrm>
+          <a:prstGeom prst="rect">
+            <a:avLst/>
+          </a:prstGeom>
+        </p:spPr>
+        <p:txBody>
+          <a:bodyPr vert="horz" lIns="91440" tIns="45720" rIns="91440" bIns="45720" rtlCol="0" anchor="t">
+            <a:noAutofit/>
+          </a:bodyPr>
+          <a:lstStyle>
+            <a:lvl1pPr algn="l" defTabSz="457200" rtl="0" eaLnBrk="1" latinLnBrk="0" hangingPunct="1">
+              <a:spcBef>
+                <a:spcPct val="0"/>
+              </a:spcBef>
+              <a:buNone/>
+              <a:defRPr sz="4200" b="0" i="0" kern="1200">
+                <a:solidFill>
+                  <a:schemeClr val="tx2"/>
+                </a:solidFill>
+                <a:latin typeface="+mj-lt"/>
+                <a:ea typeface="+mj-ea"/>
+                <a:cs typeface="+mj-cs"/>
+              </a:defRPr>
+            </a:lvl1pPr>
+            <a:lvl2pPr eaLnBrk="1" hangingPunct="1">
+              <a:defRPr>
+                <a:solidFill>
+                  <a:schemeClr val="tx2"/>
+                </a:solidFill>
+              </a:defRPr>
+            </a:lvl2pPr>
+            <a:lvl3pPr eaLnBrk="1" hangingPunct="1">
+              <a:defRPr>
+                <a:solidFill>
+                  <a:schemeClr val="tx2"/>
+                </a:solidFill>
+              </a:defRPr>
+            </a:lvl3pPr>
+            <a:lvl4pPr eaLnBrk="1" hangingPunct="1">
+              <a:defRPr>
+                <a:solidFill>
+                  <a:schemeClr val="tx2"/>
+                </a:solidFill>
+              </a:defRPr>
+            </a:lvl4pPr>
+            <a:lvl5pPr eaLnBrk="1" hangingPunct="1">
+              <a:defRPr>
+                <a:solidFill>
+                  <a:schemeClr val="tx2"/>
+                </a:solidFill>
+              </a:defRPr>
+            </a:lvl5pPr>
+            <a:lvl6pPr eaLnBrk="1" hangingPunct="1">
+              <a:defRPr>
+                <a:solidFill>
+                  <a:schemeClr val="tx2"/>
+                </a:solidFill>
+              </a:defRPr>
+            </a:lvl6pPr>
+            <a:lvl7pPr eaLnBrk="1" hangingPunct="1">
+              <a:defRPr>
+                <a:solidFill>
+                  <a:schemeClr val="tx2"/>
+                </a:solidFill>
+              </a:defRPr>
+            </a:lvl7pPr>
+            <a:lvl8pPr eaLnBrk="1" hangingPunct="1">
+              <a:defRPr>
+                <a:solidFill>
+                  <a:schemeClr val="tx2"/>
+                </a:solidFill>
+              </a:defRPr>
+            </a:lvl8pPr>
+            <a:lvl9pPr eaLnBrk="1" hangingPunct="1">
+              <a:defRPr>
+                <a:solidFill>
+                  <a:schemeClr val="tx2"/>
+                </a:solidFill>
+              </a:defRPr>
+            </a:lvl9pPr>
+          </a:lstStyle>
           <a:p>
             <a:r>
               <a:rPr lang="en-US" dirty="0"/>
-              <a:t>Models</a:t>
-            </a:r>
-          </a:p>
-        </p:txBody>
-      </p:sp>
-      <p:sp>
-        <p:nvSpPr>
-          <p:cNvPr id="3" name="Content Placeholder 2">
+              <a:t>Dataset</a:t>
+            </a:r>
+          </a:p>
+        </p:txBody>
+      </p:sp>
+      <p:pic>
+        <p:nvPicPr>
+          <p:cNvPr id="16" name="Picture 15">
             <a:extLst>
               <a:ext uri="{FF2B5EF4-FFF2-40B4-BE49-F238E27FC236}">
-                <a16:creationId xmlns:a16="http://schemas.microsoft.com/office/drawing/2014/main" id="{1112D0BB-96AC-FE52-CB51-A8E93ABE1EA2}"/>
+                <a16:creationId xmlns:a16="http://schemas.microsoft.com/office/drawing/2014/main" id="{94A82DDF-7EFD-3462-EA78-079B8315489D}"/>
               </a:ext>
             </a:extLst>
           </p:cNvPr>
-          <p:cNvSpPr>
-            <a:spLocks noGrp="1"/>
-          </p:cNvSpPr>
-          <p:nvPr>
-            <p:ph idx="1"/>
-          </p:nvPr>
-        </p:nvSpPr>
-        <p:spPr>
-          <a:xfrm>
-            <a:off x="942109" y="1385456"/>
-            <a:ext cx="9596581" cy="4862944"/>
-          </a:xfrm>
-        </p:spPr>
-        <p:txBody>
-          <a:bodyPr/>
+          <p:cNvPicPr>
+            <a:picLocks noChangeAspect="1"/>
+          </p:cNvPicPr>
+          <p:nvPr/>
+        </p:nvPicPr>
+        <p:blipFill>
+          <a:blip r:embed="rId2"/>
+          <a:stretch>
+            <a:fillRect/>
+          </a:stretch>
+        </p:blipFill>
+        <p:spPr>
+          <a:xfrm>
+            <a:off x="812801" y="1517516"/>
+            <a:ext cx="3908080" cy="4839062"/>
+          </a:xfrm>
+          <a:prstGeom prst="rect">
+            <a:avLst/>
+          </a:prstGeom>
+        </p:spPr>
+      </p:pic>
+      <p:pic>
+        <p:nvPicPr>
+          <p:cNvPr id="20" name="Picture 19">
+            <a:extLst>
+              <a:ext uri="{FF2B5EF4-FFF2-40B4-BE49-F238E27FC236}">
+                <a16:creationId xmlns:a16="http://schemas.microsoft.com/office/drawing/2014/main" id="{F69FB15E-78F0-1CC0-E4F4-8351E769ECFF}"/>
+              </a:ext>
+            </a:extLst>
+          </p:cNvPr>
+          <p:cNvPicPr>
+            <a:picLocks noChangeAspect="1"/>
+          </p:cNvPicPr>
+          <p:nvPr/>
+        </p:nvPicPr>
+        <p:blipFill>
+          <a:blip r:embed="rId3"/>
+          <a:stretch>
+            <a:fillRect/>
+          </a:stretch>
+        </p:blipFill>
+        <p:spPr>
+          <a:xfrm>
+            <a:off x="5485081" y="1517516"/>
+            <a:ext cx="6019800" cy="2486025"/>
+          </a:xfrm>
+          <a:prstGeom prst="rect">
+            <a:avLst/>
+          </a:prstGeom>
+        </p:spPr>
+      </p:pic>
+      <p:pic>
+        <p:nvPicPr>
+          <p:cNvPr id="22" name="Picture 21">
+            <a:extLst>
+              <a:ext uri="{FF2B5EF4-FFF2-40B4-BE49-F238E27FC236}">
+                <a16:creationId xmlns:a16="http://schemas.microsoft.com/office/drawing/2014/main" id="{759CA872-A66C-CD19-9177-337E9052D135}"/>
+              </a:ext>
+            </a:extLst>
+          </p:cNvPr>
+          <p:cNvPicPr>
+            <a:picLocks noChangeAspect="1"/>
+          </p:cNvPicPr>
+          <p:nvPr/>
+        </p:nvPicPr>
+        <p:blipFill>
+          <a:blip r:embed="rId4"/>
+          <a:stretch>
+            <a:fillRect/>
+          </a:stretch>
+        </p:blipFill>
+        <p:spPr>
+          <a:xfrm>
+            <a:off x="5112491" y="4949740"/>
+            <a:ext cx="6764979" cy="1406838"/>
+          </a:xfrm>
+          <a:prstGeom prst="rect">
+            <a:avLst/>
+          </a:prstGeom>
+        </p:spPr>
+      </p:pic>
+      <p:sp>
+        <p:nvSpPr>
+          <p:cNvPr id="23" name="TextBox 22">
+            <a:extLst>
+              <a:ext uri="{FF2B5EF4-FFF2-40B4-BE49-F238E27FC236}">
+                <a16:creationId xmlns:a16="http://schemas.microsoft.com/office/drawing/2014/main" id="{8856D76C-1587-E8C8-3635-C1F80EABB822}"/>
+              </a:ext>
+            </a:extLst>
+          </p:cNvPr>
+          <p:cNvSpPr txBox="1"/>
+          <p:nvPr/>
+        </p:nvSpPr>
+        <p:spPr>
+          <a:xfrm>
+            <a:off x="6926093" y="941231"/>
+            <a:ext cx="3394953" cy="523220"/>
+          </a:xfrm>
+          <a:prstGeom prst="rect">
+            <a:avLst/>
+          </a:prstGeom>
+          <a:noFill/>
+        </p:spPr>
+        <p:txBody>
+          <a:bodyPr wrap="square" rtlCol="0">
+            <a:spAutoFit/>
+          </a:bodyPr>
           <a:lstStyle/>
           <a:p>
-            <a:endParaRPr lang="en-US" dirty="0"/>
+            <a:r>
+              <a:rPr lang="en-US" sz="2800" dirty="0"/>
+              <a:t>Numerical Data</a:t>
+            </a:r>
+          </a:p>
+        </p:txBody>
+      </p:sp>
+      <p:sp>
+        <p:nvSpPr>
+          <p:cNvPr id="24" name="TextBox 23">
+            <a:extLst>
+              <a:ext uri="{FF2B5EF4-FFF2-40B4-BE49-F238E27FC236}">
+                <a16:creationId xmlns:a16="http://schemas.microsoft.com/office/drawing/2014/main" id="{B66EB3CA-AB43-4A05-A99B-57F4BD36F4D5}"/>
+              </a:ext>
+            </a:extLst>
+          </p:cNvPr>
+          <p:cNvSpPr txBox="1"/>
+          <p:nvPr/>
+        </p:nvSpPr>
+        <p:spPr>
+          <a:xfrm>
+            <a:off x="6797503" y="4320330"/>
+            <a:ext cx="3394953" cy="523220"/>
+          </a:xfrm>
+          <a:prstGeom prst="rect">
+            <a:avLst/>
+          </a:prstGeom>
+          <a:noFill/>
+        </p:spPr>
+        <p:txBody>
+          <a:bodyPr wrap="square" rtlCol="0">
+            <a:spAutoFit/>
+          </a:bodyPr>
+          <a:lstStyle/>
+          <a:p>
+            <a:r>
+              <a:rPr lang="en-US" sz="2800" dirty="0"/>
+              <a:t>Categorical Data</a:t>
+            </a:r>
           </a:p>
         </p:txBody>
       </p:sp>
     </p:spTree>
     <p:extLst>
       <p:ext uri="{BB962C8B-B14F-4D97-AF65-F5344CB8AC3E}">
-        <p14:creationId xmlns:p14="http://schemas.microsoft.com/office/powerpoint/2010/main" val="1308103119"/>
+        <p14:creationId xmlns:p14="http://schemas.microsoft.com/office/powerpoint/2010/main" val="1018628374"/>
       </p:ext>
     </p:extLst>
   </p:cSld>
@@ -6421,14 +6673,6 @@
 <file path=ppt/slides/slide4.xml><?xml version="1.0" encoding="utf-8"?>
 <p:sld xmlns:a="http://schemas.openxmlformats.org/drawingml/2006/main" xmlns:r="http://schemas.openxmlformats.org/officeDocument/2006/relationships" xmlns:p="http://schemas.openxmlformats.org/presentationml/2006/main" showMasterSp="0">
   <p:cSld>
-    <p:bg>
-      <p:bgPr>
-        <a:solidFill>
-          <a:schemeClr val="bg2"/>
-        </a:solidFill>
-        <a:effectLst/>
-      </p:bgPr>
-    </p:bg>
     <p:spTree>
       <p:nvGrpSpPr>
         <p:cNvPr id="1" name=""/>
@@ -6448,6 +6692,297 @@
           <p:cNvPr id="2" name="Title 1">
             <a:extLst>
               <a:ext uri="{FF2B5EF4-FFF2-40B4-BE49-F238E27FC236}">
+                <a16:creationId xmlns:a16="http://schemas.microsoft.com/office/drawing/2014/main" id="{0C971921-7283-188C-DD57-582B84E62961}"/>
+              </a:ext>
+            </a:extLst>
+          </p:cNvPr>
+          <p:cNvSpPr>
+            <a:spLocks noGrp="1"/>
+          </p:cNvSpPr>
+          <p:nvPr>
+            <p:ph type="title"/>
+          </p:nvPr>
+        </p:nvSpPr>
+        <p:spPr>
+          <a:xfrm>
+            <a:off x="646111" y="452718"/>
+            <a:ext cx="9404723" cy="794191"/>
+          </a:xfrm>
+        </p:spPr>
+        <p:txBody>
+          <a:bodyPr/>
+          <a:lstStyle/>
+          <a:p>
+            <a:r>
+              <a:rPr lang="en-US" dirty="0"/>
+              <a:t>Models</a:t>
+            </a:r>
+          </a:p>
+        </p:txBody>
+      </p:sp>
+      <p:sp>
+        <p:nvSpPr>
+          <p:cNvPr id="3" name="Content Placeholder 2">
+            <a:extLst>
+              <a:ext uri="{FF2B5EF4-FFF2-40B4-BE49-F238E27FC236}">
+                <a16:creationId xmlns:a16="http://schemas.microsoft.com/office/drawing/2014/main" id="{1112D0BB-96AC-FE52-CB51-A8E93ABE1EA2}"/>
+              </a:ext>
+            </a:extLst>
+          </p:cNvPr>
+          <p:cNvSpPr>
+            <a:spLocks noGrp="1"/>
+          </p:cNvSpPr>
+          <p:nvPr>
+            <p:ph idx="1"/>
+          </p:nvPr>
+        </p:nvSpPr>
+        <p:spPr>
+          <a:xfrm>
+            <a:off x="942109" y="1385456"/>
+            <a:ext cx="9596581" cy="4862944"/>
+          </a:xfrm>
+        </p:spPr>
+        <p:txBody>
+          <a:bodyPr/>
+          <a:lstStyle/>
+          <a:p>
+            <a:r>
+              <a:rPr lang="en-US" dirty="0"/>
+              <a:t>Logistic Regression</a:t>
+            </a:r>
+          </a:p>
+          <a:p>
+            <a:pPr lvl="1"/>
+            <a:r>
+              <a:rPr lang="en-US" dirty="0"/>
+              <a:t>Easier to implement</a:t>
+            </a:r>
+          </a:p>
+          <a:p>
+            <a:pPr lvl="1"/>
+            <a:r>
+              <a:rPr lang="en-US" dirty="0"/>
+              <a:t>Scales well on an industry level</a:t>
+            </a:r>
+          </a:p>
+          <a:p>
+            <a:pPr lvl="1"/>
+            <a:endParaRPr lang="en-US" dirty="0"/>
+          </a:p>
+          <a:p>
+            <a:r>
+              <a:rPr lang="en-US" dirty="0"/>
+              <a:t>Random Forest Classification</a:t>
+            </a:r>
+          </a:p>
+          <a:p>
+            <a:pPr lvl="1"/>
+            <a:r>
+              <a:rPr lang="en-US" dirty="0"/>
+              <a:t>Can better capture complex relationships</a:t>
+            </a:r>
+          </a:p>
+          <a:p>
+            <a:pPr lvl="1"/>
+            <a:r>
+              <a:rPr lang="en-US" dirty="0"/>
+              <a:t>Better with handling larger number of categorical variable than LR</a:t>
+            </a:r>
+          </a:p>
+          <a:p>
+            <a:pPr lvl="1"/>
+            <a:endParaRPr lang="en-US" dirty="0"/>
+          </a:p>
+        </p:txBody>
+      </p:sp>
+    </p:spTree>
+    <p:extLst>
+      <p:ext uri="{BB962C8B-B14F-4D97-AF65-F5344CB8AC3E}">
+        <p14:creationId xmlns:p14="http://schemas.microsoft.com/office/powerpoint/2010/main" val="1308103119"/>
+      </p:ext>
+    </p:extLst>
+  </p:cSld>
+  <p:clrMapOvr>
+    <a:masterClrMapping/>
+  </p:clrMapOvr>
+</p:sld>
+</file>
+
+<file path=ppt/slides/slide5.xml><?xml version="1.0" encoding="utf-8"?>
+<p:sld xmlns:a="http://schemas.openxmlformats.org/drawingml/2006/main" xmlns:r="http://schemas.openxmlformats.org/officeDocument/2006/relationships" xmlns:p="http://schemas.openxmlformats.org/presentationml/2006/main" showMasterSp="0">
+  <p:cSld>
+    <p:spTree>
+      <p:nvGrpSpPr>
+        <p:cNvPr id="1" name=""/>
+        <p:cNvGrpSpPr/>
+        <p:nvPr/>
+      </p:nvGrpSpPr>
+      <p:grpSpPr>
+        <a:xfrm>
+          <a:off x="0" y="0"/>
+          <a:ext cx="0" cy="0"/>
+          <a:chOff x="0" y="0"/>
+          <a:chExt cx="0" cy="0"/>
+        </a:xfrm>
+      </p:grpSpPr>
+      <p:sp>
+        <p:nvSpPr>
+          <p:cNvPr id="2" name="Title 1">
+            <a:extLst>
+              <a:ext uri="{FF2B5EF4-FFF2-40B4-BE49-F238E27FC236}">
+                <a16:creationId xmlns:a16="http://schemas.microsoft.com/office/drawing/2014/main" id="{A6132CCE-3CD3-19E1-23A2-9BE3536DEA31}"/>
+              </a:ext>
+            </a:extLst>
+          </p:cNvPr>
+          <p:cNvSpPr>
+            <a:spLocks noGrp="1"/>
+          </p:cNvSpPr>
+          <p:nvPr>
+            <p:ph type="title"/>
+          </p:nvPr>
+        </p:nvSpPr>
+        <p:spPr>
+          <a:xfrm>
+            <a:off x="255243" y="452718"/>
+            <a:ext cx="1252544" cy="2105656"/>
+          </a:xfrm>
+        </p:spPr>
+        <p:txBody>
+          <a:bodyPr/>
+          <a:lstStyle/>
+          <a:p>
+            <a:r>
+              <a:rPr lang="en-US" dirty="0"/>
+              <a:t>LR vs RFC</a:t>
+            </a:r>
+          </a:p>
+        </p:txBody>
+      </p:sp>
+      <p:pic>
+        <p:nvPicPr>
+          <p:cNvPr id="17" name="Picture 16">
+            <a:extLst>
+              <a:ext uri="{FF2B5EF4-FFF2-40B4-BE49-F238E27FC236}">
+                <a16:creationId xmlns:a16="http://schemas.microsoft.com/office/drawing/2014/main" id="{B1555D17-66F8-687A-EC60-57D62FE8D7A8}"/>
+              </a:ext>
+            </a:extLst>
+          </p:cNvPr>
+          <p:cNvPicPr>
+            <a:picLocks noChangeAspect="1"/>
+          </p:cNvPicPr>
+          <p:nvPr/>
+        </p:nvPicPr>
+        <p:blipFill>
+          <a:blip r:embed="rId2"/>
+          <a:stretch>
+            <a:fillRect/>
+          </a:stretch>
+        </p:blipFill>
+        <p:spPr>
+          <a:xfrm>
+            <a:off x="6928681" y="0"/>
+            <a:ext cx="5263319" cy="6858000"/>
+          </a:xfrm>
+          <a:prstGeom prst="rect">
+            <a:avLst/>
+          </a:prstGeom>
+        </p:spPr>
+      </p:pic>
+      <p:pic>
+        <p:nvPicPr>
+          <p:cNvPr id="19" name="Picture 18">
+            <a:extLst>
+              <a:ext uri="{FF2B5EF4-FFF2-40B4-BE49-F238E27FC236}">
+                <a16:creationId xmlns:a16="http://schemas.microsoft.com/office/drawing/2014/main" id="{649774CE-8EC0-F7D1-157B-6CBBDACD32EC}"/>
+              </a:ext>
+            </a:extLst>
+          </p:cNvPr>
+          <p:cNvPicPr>
+            <a:picLocks noChangeAspect="1"/>
+          </p:cNvPicPr>
+          <p:nvPr/>
+        </p:nvPicPr>
+        <p:blipFill>
+          <a:blip r:embed="rId3"/>
+          <a:stretch>
+            <a:fillRect/>
+          </a:stretch>
+        </p:blipFill>
+        <p:spPr>
+          <a:xfrm>
+            <a:off x="1665362" y="2552446"/>
+            <a:ext cx="5263319" cy="4305553"/>
+          </a:xfrm>
+          <a:prstGeom prst="rect">
+            <a:avLst/>
+          </a:prstGeom>
+        </p:spPr>
+      </p:pic>
+      <p:pic>
+        <p:nvPicPr>
+          <p:cNvPr id="21" name="Picture 20">
+            <a:extLst>
+              <a:ext uri="{FF2B5EF4-FFF2-40B4-BE49-F238E27FC236}">
+                <a16:creationId xmlns:a16="http://schemas.microsoft.com/office/drawing/2014/main" id="{D9E1E926-D42F-CA17-1065-34EBF00DC189}"/>
+              </a:ext>
+            </a:extLst>
+          </p:cNvPr>
+          <p:cNvPicPr>
+            <a:picLocks noChangeAspect="1"/>
+          </p:cNvPicPr>
+          <p:nvPr/>
+        </p:nvPicPr>
+        <p:blipFill>
+          <a:blip r:embed="rId4"/>
+          <a:stretch>
+            <a:fillRect/>
+          </a:stretch>
+        </p:blipFill>
+        <p:spPr>
+          <a:xfrm>
+            <a:off x="1665362" y="0"/>
+            <a:ext cx="5263319" cy="2552445"/>
+          </a:xfrm>
+          <a:prstGeom prst="rect">
+            <a:avLst/>
+          </a:prstGeom>
+        </p:spPr>
+      </p:pic>
+    </p:spTree>
+    <p:extLst>
+      <p:ext uri="{BB962C8B-B14F-4D97-AF65-F5344CB8AC3E}">
+        <p14:creationId xmlns:p14="http://schemas.microsoft.com/office/powerpoint/2010/main" val="3873212564"/>
+      </p:ext>
+    </p:extLst>
+  </p:cSld>
+  <p:clrMapOvr>
+    <a:masterClrMapping/>
+  </p:clrMapOvr>
+</p:sld>
+</file>
+
+<file path=ppt/slides/slide6.xml><?xml version="1.0" encoding="utf-8"?>
+<p:sld xmlns:a="http://schemas.openxmlformats.org/drawingml/2006/main" xmlns:r="http://schemas.openxmlformats.org/officeDocument/2006/relationships" xmlns:p="http://schemas.openxmlformats.org/presentationml/2006/main" showMasterSp="0">
+  <p:cSld>
+    <p:spTree>
+      <p:nvGrpSpPr>
+        <p:cNvPr id="1" name=""/>
+        <p:cNvGrpSpPr/>
+        <p:nvPr/>
+      </p:nvGrpSpPr>
+      <p:grpSpPr>
+        <a:xfrm>
+          <a:off x="0" y="0"/>
+          <a:ext cx="0" cy="0"/>
+          <a:chOff x="0" y="0"/>
+          <a:chExt cx="0" cy="0"/>
+        </a:xfrm>
+      </p:grpSpPr>
+      <p:sp>
+        <p:nvSpPr>
+          <p:cNvPr id="2" name="Title 1">
+            <a:extLst>
+              <a:ext uri="{FF2B5EF4-FFF2-40B4-BE49-F238E27FC236}">
                 <a16:creationId xmlns:a16="http://schemas.microsoft.com/office/drawing/2014/main" id="{B7603098-E532-D374-4FC1-FFA4F816253A}"/>
               </a:ext>
             </a:extLst>
@@ -6459,14 +6994,19 @@
             <p:ph type="title"/>
           </p:nvPr>
         </p:nvSpPr>
-        <p:spPr/>
+        <p:spPr>
+          <a:xfrm>
+            <a:off x="1393638" y="373750"/>
+            <a:ext cx="9404723" cy="841061"/>
+          </a:xfrm>
+        </p:spPr>
         <p:txBody>
           <a:bodyPr/>
           <a:lstStyle/>
           <a:p>
             <a:r>
               <a:rPr lang="en-US" dirty="0"/>
-              <a:t>Conclusion</a:t>
+              <a:t>Improving Predictive Power</a:t>
             </a:r>
           </a:p>
         </p:txBody>
@@ -6487,12 +7027,55 @@
             <p:ph idx="1"/>
           </p:nvPr>
         </p:nvSpPr>
-        <p:spPr/>
-        <p:txBody>
-          <a:bodyPr/>
+        <p:spPr>
+          <a:xfrm>
+            <a:off x="1301842" y="1293780"/>
+            <a:ext cx="9588314" cy="5190470"/>
+          </a:xfrm>
+        </p:spPr>
+        <p:txBody>
+          <a:bodyPr>
+            <a:normAutofit/>
+          </a:bodyPr>
           <a:lstStyle/>
           <a:p>
-            <a:endParaRPr lang="en-US"/>
+            <a:r>
+              <a:rPr lang="en-US" sz="2400" dirty="0"/>
+              <a:t>Having more data </a:t>
+            </a:r>
+          </a:p>
+          <a:p>
+            <a:r>
+              <a:rPr lang="en-US" sz="2400" dirty="0"/>
+              <a:t>Hyperparameter tuning using </a:t>
+            </a:r>
+            <a:r>
+              <a:rPr lang="en-US" sz="2400" dirty="0" err="1"/>
+              <a:t>GridSearch</a:t>
+            </a:r>
+            <a:r>
+              <a:rPr lang="en-US" sz="2400" dirty="0"/>
+              <a:t>, </a:t>
+            </a:r>
+            <a:r>
+              <a:rPr lang="en-US" sz="2400" dirty="0" err="1"/>
+              <a:t>RandomSearch</a:t>
+            </a:r>
+            <a:r>
+              <a:rPr lang="en-US" sz="2400" dirty="0"/>
+              <a:t>, </a:t>
+            </a:r>
+            <a:r>
+              <a:rPr lang="en-US" sz="2400" dirty="0" err="1"/>
+              <a:t>etc</a:t>
+            </a:r>
+            <a:endParaRPr lang="en-US" sz="2400" dirty="0"/>
+          </a:p>
+          <a:p>
+            <a:r>
+              <a:rPr lang="en-US" sz="2400" dirty="0"/>
+              <a:t>Better feature engineering and selection</a:t>
+            </a:r>
           </a:p>
         </p:txBody>
       </p:sp>

</xml_diff>

<commit_message>
actual second to last update
</commit_message>
<xml_diff>
--- a/Predictive Analytics.pptx
+++ b/Predictive Analytics.pptx
@@ -6860,36 +6860,6 @@
       </p:sp>
       <p:pic>
         <p:nvPicPr>
-          <p:cNvPr id="17" name="Picture 16">
-            <a:extLst>
-              <a:ext uri="{FF2B5EF4-FFF2-40B4-BE49-F238E27FC236}">
-                <a16:creationId xmlns:a16="http://schemas.microsoft.com/office/drawing/2014/main" id="{B1555D17-66F8-687A-EC60-57D62FE8D7A8}"/>
-              </a:ext>
-            </a:extLst>
-          </p:cNvPr>
-          <p:cNvPicPr>
-            <a:picLocks noChangeAspect="1"/>
-          </p:cNvPicPr>
-          <p:nvPr/>
-        </p:nvPicPr>
-        <p:blipFill>
-          <a:blip r:embed="rId2"/>
-          <a:stretch>
-            <a:fillRect/>
-          </a:stretch>
-        </p:blipFill>
-        <p:spPr>
-          <a:xfrm>
-            <a:off x="6928681" y="0"/>
-            <a:ext cx="5263319" cy="6858000"/>
-          </a:xfrm>
-          <a:prstGeom prst="rect">
-            <a:avLst/>
-          </a:prstGeom>
-        </p:spPr>
-      </p:pic>
-      <p:pic>
-        <p:nvPicPr>
           <p:cNvPr id="19" name="Picture 18">
             <a:extLst>
               <a:ext uri="{FF2B5EF4-FFF2-40B4-BE49-F238E27FC236}">
@@ -6903,7 +6873,7 @@
           <p:nvPr/>
         </p:nvPicPr>
         <p:blipFill>
-          <a:blip r:embed="rId3"/>
+          <a:blip r:embed="rId2"/>
           <a:stretch>
             <a:fillRect/>
           </a:stretch>
@@ -6933,6 +6903,36 @@
           <p:nvPr/>
         </p:nvPicPr>
         <p:blipFill>
+          <a:blip r:embed="rId3"/>
+          <a:stretch>
+            <a:fillRect/>
+          </a:stretch>
+        </p:blipFill>
+        <p:spPr>
+          <a:xfrm>
+            <a:off x="1665362" y="0"/>
+            <a:ext cx="5263319" cy="2552445"/>
+          </a:xfrm>
+          <a:prstGeom prst="rect">
+            <a:avLst/>
+          </a:prstGeom>
+        </p:spPr>
+      </p:pic>
+      <p:pic>
+        <p:nvPicPr>
+          <p:cNvPr id="23" name="Picture 22">
+            <a:extLst>
+              <a:ext uri="{FF2B5EF4-FFF2-40B4-BE49-F238E27FC236}">
+                <a16:creationId xmlns:a16="http://schemas.microsoft.com/office/drawing/2014/main" id="{DEDA0F87-FF53-A9DB-2C44-A0C5D330A67B}"/>
+              </a:ext>
+            </a:extLst>
+          </p:cNvPr>
+          <p:cNvPicPr>
+            <a:picLocks noChangeAspect="1"/>
+          </p:cNvPicPr>
+          <p:nvPr/>
+        </p:nvPicPr>
+        <p:blipFill>
           <a:blip r:embed="rId4"/>
           <a:stretch>
             <a:fillRect/>
@@ -6940,8 +6940,8 @@
         </p:blipFill>
         <p:spPr>
           <a:xfrm>
-            <a:off x="1665362" y="0"/>
-            <a:ext cx="5263319" cy="2552445"/>
+            <a:off x="6928680" y="0"/>
+            <a:ext cx="5263319" cy="6858000"/>
           </a:xfrm>
           <a:prstGeom prst="rect">
             <a:avLst/>
@@ -7075,6 +7075,12 @@
             <a:r>
               <a:rPr lang="en-US" sz="2400" dirty="0"/>
               <a:t>Better feature engineering and selection</a:t>
+            </a:r>
+          </a:p>
+          <a:p>
+            <a:r>
+              <a:rPr lang="en-US" sz="2400" dirty="0"/>
+              <a:t>Cross-validating through multiple models</a:t>
             </a:r>
           </a:p>
         </p:txBody>

</xml_diff>